<commit_message>
Created the Video and finished with presentation and poster
</commit_message>
<xml_diff>
--- a/Project/תבנית לפוסטר של פרויקט סוף קורס.pptx
+++ b/Project/תבנית לפוסטר של פרויקט סוף קורס.pptx
@@ -243,7 +243,7 @@
           <a:p>
             <a:fld id="{96F86DA2-6F35-4111-ACB3-E2300C0C7C15}" type="datetimeFigureOut">
               <a:rPr lang="en-GB" smtClean="0"/>
-              <a:t>30/01/2019</a:t>
+              <a:t>08/09/2020</a:t>
             </a:fld>
             <a:endParaRPr lang="en-GB"/>
           </a:p>
@@ -413,7 +413,7 @@
           <a:p>
             <a:fld id="{96F86DA2-6F35-4111-ACB3-E2300C0C7C15}" type="datetimeFigureOut">
               <a:rPr lang="en-GB" smtClean="0"/>
-              <a:t>30/01/2019</a:t>
+              <a:t>08/09/2020</a:t>
             </a:fld>
             <a:endParaRPr lang="en-GB"/>
           </a:p>
@@ -593,7 +593,7 @@
           <a:p>
             <a:fld id="{96F86DA2-6F35-4111-ACB3-E2300C0C7C15}" type="datetimeFigureOut">
               <a:rPr lang="en-GB" smtClean="0"/>
-              <a:t>30/01/2019</a:t>
+              <a:t>08/09/2020</a:t>
             </a:fld>
             <a:endParaRPr lang="en-GB"/>
           </a:p>
@@ -763,7 +763,7 @@
           <a:p>
             <a:fld id="{96F86DA2-6F35-4111-ACB3-E2300C0C7C15}" type="datetimeFigureOut">
               <a:rPr lang="en-GB" smtClean="0"/>
-              <a:t>30/01/2019</a:t>
+              <a:t>08/09/2020</a:t>
             </a:fld>
             <a:endParaRPr lang="en-GB"/>
           </a:p>
@@ -1007,7 +1007,7 @@
           <a:p>
             <a:fld id="{96F86DA2-6F35-4111-ACB3-E2300C0C7C15}" type="datetimeFigureOut">
               <a:rPr lang="en-GB" smtClean="0"/>
-              <a:t>30/01/2019</a:t>
+              <a:t>08/09/2020</a:t>
             </a:fld>
             <a:endParaRPr lang="en-GB"/>
           </a:p>
@@ -1239,7 +1239,7 @@
           <a:p>
             <a:fld id="{96F86DA2-6F35-4111-ACB3-E2300C0C7C15}" type="datetimeFigureOut">
               <a:rPr lang="en-GB" smtClean="0"/>
-              <a:t>30/01/2019</a:t>
+              <a:t>08/09/2020</a:t>
             </a:fld>
             <a:endParaRPr lang="en-GB"/>
           </a:p>
@@ -1606,7 +1606,7 @@
           <a:p>
             <a:fld id="{96F86DA2-6F35-4111-ACB3-E2300C0C7C15}" type="datetimeFigureOut">
               <a:rPr lang="en-GB" smtClean="0"/>
-              <a:t>30/01/2019</a:t>
+              <a:t>08/09/2020</a:t>
             </a:fld>
             <a:endParaRPr lang="en-GB"/>
           </a:p>
@@ -1724,7 +1724,7 @@
           <a:p>
             <a:fld id="{96F86DA2-6F35-4111-ACB3-E2300C0C7C15}" type="datetimeFigureOut">
               <a:rPr lang="en-GB" smtClean="0"/>
-              <a:t>30/01/2019</a:t>
+              <a:t>08/09/2020</a:t>
             </a:fld>
             <a:endParaRPr lang="en-GB"/>
           </a:p>
@@ -1819,7 +1819,7 @@
           <a:p>
             <a:fld id="{96F86DA2-6F35-4111-ACB3-E2300C0C7C15}" type="datetimeFigureOut">
               <a:rPr lang="en-GB" smtClean="0"/>
-              <a:t>30/01/2019</a:t>
+              <a:t>08/09/2020</a:t>
             </a:fld>
             <a:endParaRPr lang="en-GB"/>
           </a:p>
@@ -2096,7 +2096,7 @@
           <a:p>
             <a:fld id="{96F86DA2-6F35-4111-ACB3-E2300C0C7C15}" type="datetimeFigureOut">
               <a:rPr lang="en-GB" smtClean="0"/>
-              <a:t>30/01/2019</a:t>
+              <a:t>08/09/2020</a:t>
             </a:fld>
             <a:endParaRPr lang="en-GB"/>
           </a:p>
@@ -2353,7 +2353,7 @@
           <a:p>
             <a:fld id="{96F86DA2-6F35-4111-ACB3-E2300C0C7C15}" type="datetimeFigureOut">
               <a:rPr lang="en-GB" smtClean="0"/>
-              <a:t>30/01/2019</a:t>
+              <a:t>08/09/2020</a:t>
             </a:fld>
             <a:endParaRPr lang="en-GB"/>
           </a:p>
@@ -2566,7 +2566,7 @@
           <a:p>
             <a:fld id="{96F86DA2-6F35-4111-ACB3-E2300C0C7C15}" type="datetimeFigureOut">
               <a:rPr lang="en-GB" smtClean="0"/>
-              <a:t>30/01/2019</a:t>
+              <a:t>08/09/2020</a:t>
             </a:fld>
             <a:endParaRPr lang="en-GB"/>
           </a:p>
@@ -2986,14 +2986,14 @@
           <p:nvPr>
             <p:extLst>
               <p:ext uri="{D42A27DB-BD31-4B8C-83A1-F6EECF244321}">
-                <p14:modId xmlns:p14="http://schemas.microsoft.com/office/powerpoint/2010/main" val="3775793251"/>
+                <p14:modId xmlns:p14="http://schemas.microsoft.com/office/powerpoint/2010/main" val="840518187"/>
               </p:ext>
             </p:extLst>
           </p:nvPr>
         </p:nvGraphicFramePr>
         <p:xfrm>
           <a:off x="818147" y="665380"/>
-          <a:ext cx="23509706" cy="3563720"/>
+          <a:ext cx="23509706" cy="3702100"/>
         </p:xfrm>
         <a:graphic>
           <a:graphicData uri="http://schemas.openxmlformats.org/drawingml/2006/table">
@@ -3049,7 +3049,7 @@
                       </a:pPr>
                       <a:r>
                         <a:rPr lang="en-US" sz="4000" dirty="0"/>
-                        <a:t>&lt;Course Name&gt;</a:t>
+                        <a:t>Algorithms in multimedia and machine learning in the Python environment</a:t>
                       </a:r>
                       <a:endParaRPr lang="en-GB" sz="4000" dirty="0"/>
                     </a:p>
@@ -3068,14 +3068,14 @@
                       <a:pPr algn="ctr"/>
                       <a:r>
                         <a:rPr lang="en-US" sz="7600" dirty="0"/>
-                        <a:t>&lt;Project Name&gt;</a:t>
+                        <a:t>Location of corners and intersection of lines in an image</a:t>
                       </a:r>
                     </a:p>
                     <a:p>
                       <a:pPr algn="ctr"/>
                       <a:r>
                         <a:rPr lang="en-US" sz="5400" dirty="0"/>
-                        <a:t>&lt;Names of participating students&gt;</a:t>
+                        <a:t>Haim Adrian</a:t>
                       </a:r>
                       <a:endParaRPr lang="en-GB" sz="5400" dirty="0"/>
                     </a:p>
@@ -3130,12 +3130,20 @@
                         <a:defRPr/>
                       </a:pPr>
                       <a:r>
+                        <a:rPr lang="en-US" sz="5400" b="1" dirty="0" err="1">
+                          <a:solidFill>
+                            <a:schemeClr val="bg1"/>
+                          </a:solidFill>
+                        </a:rPr>
+                        <a:t>Yakir</a:t>
+                      </a:r>
+                      <a:r>
                         <a:rPr lang="en-US" sz="5400" b="1" dirty="0">
                           <a:solidFill>
                             <a:schemeClr val="bg1"/>
                           </a:solidFill>
                         </a:rPr>
-                        <a:t>&lt;Lecturer Name&gt;</a:t>
+                        <a:t> Menahem</a:t>
                       </a:r>
                       <a:endParaRPr lang="en-GB" sz="5400" b="1" dirty="0">
                         <a:solidFill>
@@ -3310,8 +3318,8 @@
         </p:nvSpPr>
         <p:spPr>
           <a:xfrm>
-            <a:off x="2911641" y="8720406"/>
-            <a:ext cx="19659601" cy="13388280"/>
+            <a:off x="2911641" y="7794282"/>
+            <a:ext cx="19659601" cy="24468237"/>
           </a:xfrm>
           <a:prstGeom prst="rect">
             <a:avLst/>
@@ -3328,205 +3336,237 @@
           </a:bodyPr>
           <a:lstStyle/>
           <a:p>
-            <a:pPr marL="914400" indent="-914400">
-              <a:buFont typeface="+mj-lt"/>
-              <a:buAutoNum type="arabicPeriod"/>
-            </a:pPr>
+            <a:r>
+              <a:rPr lang="en-US" sz="3600" b="1" dirty="0"/>
+              <a:t>Introduction</a:t>
+            </a:r>
+          </a:p>
+          <a:p>
             <a:r>
               <a:rPr lang="en-US" sz="3600" dirty="0"/>
-              <a:t>You are not allowed to change poster size B1 (70x100 cm).</a:t>
-            </a:r>
-          </a:p>
-          <a:p>
-            <a:pPr marL="914400" indent="-914400">
-              <a:buFont typeface="+mj-lt"/>
-              <a:buAutoNum type="arabicPeriod"/>
-            </a:pPr>
+              <a:t>Corner detection is used within computer vision systems in order to extract features from images to be recognized in some manner, e.g. object recognition, motion detection, etc.</a:t>
+            </a:r>
+          </a:p>
+          <a:p>
             <a:r>
               <a:rPr lang="en-US" sz="3600" dirty="0"/>
-              <a:t>You are not allowed to change the header section format.</a:t>
-            </a:r>
-          </a:p>
-          <a:p>
-            <a:pPr marL="914400" indent="-914400">
-              <a:buFont typeface="+mj-lt"/>
-              <a:buAutoNum type="arabicPeriod"/>
-            </a:pPr>
+              <a:t>Corner points use the distribution of few points to preserve the important features of the image, thus reduces the amount of data to be processed.</a:t>
+            </a:r>
+          </a:p>
+          <a:p>
+            <a:endParaRPr lang="en-US" sz="3600" dirty="0"/>
+          </a:p>
+          <a:p>
+            <a:r>
+              <a:rPr lang="en-US" sz="3600" b="1" dirty="0"/>
+              <a:t>The project</a:t>
+            </a:r>
+          </a:p>
+          <a:p>
             <a:r>
               <a:rPr lang="en-US" sz="3600" dirty="0"/>
-              <a:t>Project name size should be between 74-78.</a:t>
-            </a:r>
-          </a:p>
-          <a:p>
-            <a:pPr marL="914400" indent="-914400">
-              <a:buFont typeface="+mj-lt"/>
-              <a:buAutoNum type="arabicPeriod"/>
-            </a:pPr>
-            <a:r>
+              <a:t>The project was implemented with GUI, using Python</a:t>
+            </a:r>
+            <a:br>
               <a:rPr lang="en-US" sz="3600" dirty="0"/>
-              <a:t>Section titles should have size between 52-56.</a:t>
-            </a:r>
-          </a:p>
-          <a:p>
-            <a:pPr marL="914400" indent="-914400">
-              <a:buFont typeface="+mj-lt"/>
-              <a:buAutoNum type="arabicPeriod"/>
-            </a:pPr>
+            </a:br>
+            <a:r>
+              <a:rPr lang="en-US" sz="3600" dirty="0" err="1"/>
+              <a:t>tkinter</a:t>
+            </a:r>
             <a:r>
               <a:rPr lang="en-US" sz="3600" dirty="0"/>
-              <a:t>Lecturer name and participants names should have size between 52-56.</a:t>
-            </a:r>
-          </a:p>
-          <a:p>
-            <a:pPr marL="914400" indent="-914400">
-              <a:buFont typeface="+mj-lt"/>
-              <a:buAutoNum type="arabicPeriod"/>
-            </a:pPr>
+              <a:t> library with interactive UI.</a:t>
+            </a:r>
+          </a:p>
+          <a:p>
             <a:r>
               <a:rPr lang="en-US" sz="3600" dirty="0"/>
-              <a:t>Course name should have size between 38-42.</a:t>
-            </a:r>
-          </a:p>
-          <a:p>
-            <a:pPr marL="914400" indent="-914400">
-              <a:buFont typeface="+mj-lt"/>
-              <a:buAutoNum type="arabicPeriod"/>
-            </a:pPr>
-            <a:r>
+              <a:t>Images are plotted inside the main window, using </a:t>
+            </a:r>
+            <a:br>
               <a:rPr lang="en-US" sz="3600" dirty="0"/>
-              <a:t>Body texts of the poster should have size between 32-38.</a:t>
-            </a:r>
-          </a:p>
-          <a:p>
-            <a:pPr marL="914400" indent="-914400">
-              <a:buFont typeface="+mj-lt"/>
-              <a:buAutoNum type="arabicPeriod"/>
-            </a:pPr>
+            </a:br>
             <a:r>
               <a:rPr lang="en-US" sz="3600" dirty="0"/>
-              <a:t>Replace the current text in the header with correct information.</a:t>
-            </a:r>
-          </a:p>
-          <a:p>
-            <a:pPr marL="914400" indent="-914400">
-              <a:buFont typeface="+mj-lt"/>
-              <a:buAutoNum type="arabicPeriod"/>
-            </a:pPr>
-            <a:r>
+              <a:t>embedded matplotlib frame, with an option to pop </a:t>
+            </a:r>
+            <a:br>
               <a:rPr lang="en-US" sz="3600" dirty="0"/>
-              <a:t>You may change the colors, fonts and font sizes of the header within the restrictions as long as header size and format stay unchanged.</a:t>
-            </a:r>
-          </a:p>
-          <a:p>
-            <a:pPr marL="914400" indent="-914400">
-              <a:buFont typeface="+mj-lt"/>
-              <a:buAutoNum type="arabicPeriod"/>
-            </a:pPr>
+            </a:br>
             <a:r>
               <a:rPr lang="en-US" sz="3600" dirty="0"/>
-              <a:t>You may design the body section as you please but under these constrains:</a:t>
-            </a:r>
-          </a:p>
-          <a:p>
-            <a:pPr marL="1371600" lvl="1" indent="-914400">
-              <a:buFont typeface="+mj-lt"/>
-              <a:buAutoNum type="alphaLcParenR"/>
-            </a:pPr>
+              <a:t>it out and have the original matplotlib frame.</a:t>
+            </a:r>
+          </a:p>
+          <a:p>
             <a:r>
               <a:rPr lang="en-US" sz="3600" dirty="0"/>
-              <a:t>Body must include the following sections in this exact order:</a:t>
-            </a:r>
-          </a:p>
-          <a:p>
-            <a:pPr marL="1828800" lvl="2" indent="-914400">
-              <a:buFont typeface="Arial" panose="020B0604020202020204" pitchFamily="34" charset="0"/>
-              <a:buChar char="•"/>
-            </a:pPr>
-            <a:r>
+              <a:t>The project has persistent settings, allowing user to </a:t>
+            </a:r>
+            <a:br>
               <a:rPr lang="en-US" sz="3600" dirty="0"/>
-              <a:t>Introduction – overview of the project.</a:t>
-            </a:r>
-          </a:p>
-          <a:p>
-            <a:pPr marL="1828800" lvl="2" indent="-914400">
-              <a:buFont typeface="Arial" panose="020B0604020202020204" pitchFamily="34" charset="0"/>
-              <a:buChar char="•"/>
-            </a:pPr>
+            </a:br>
             <a:r>
               <a:rPr lang="en-US" sz="3600" dirty="0"/>
-              <a:t>&lt;Read part (b)&gt;</a:t>
-            </a:r>
-          </a:p>
-          <a:p>
-            <a:pPr marL="1828800" lvl="2" indent="-914400">
-              <a:buFont typeface="Arial" panose="020B0604020202020204" pitchFamily="34" charset="0"/>
-              <a:buChar char="•"/>
-            </a:pPr>
-            <a:r>
+              <a:t>define thresholds, select marking color and whether </a:t>
+            </a:r>
+            <a:br>
               <a:rPr lang="en-US" sz="3600" dirty="0"/>
-              <a:t>Conclusions – achieved goals, received results and their comparison to the defined targets of project as set at its beginning.</a:t>
-            </a:r>
-          </a:p>
-          <a:p>
-            <a:pPr marL="1828800" lvl="2" indent="-914400">
-              <a:buFont typeface="Arial" panose="020B0604020202020204" pitchFamily="34" charset="0"/>
-              <a:buChar char="•"/>
-            </a:pPr>
+            </a:br>
             <a:r>
               <a:rPr lang="en-US" sz="3600" dirty="0"/>
-              <a:t>Discussions – vision of further development of the project, QR code to the video and source codes of the project (if applicable).</a:t>
-            </a:r>
-          </a:p>
-          <a:p>
-            <a:pPr marL="1371600" lvl="1" indent="-914400">
-              <a:buFont typeface="+mj-lt"/>
-              <a:buAutoNum type="alphaLcParenR"/>
-            </a:pPr>
-            <a:r>
+              <a:t>to use rectangles as a mark sign or dots, thus making </a:t>
+            </a:r>
+            <a:br>
               <a:rPr lang="en-US" sz="3600" dirty="0"/>
-              <a:t>In (a), the blank paragraph is where you add your own section/s. You must add at least one section and you cannot add more than two sections.</a:t>
-            </a:r>
-          </a:p>
-          <a:p>
-            <a:pPr marL="914400" indent="-914400">
-              <a:buFont typeface="+mj-lt"/>
-              <a:buAutoNum type="arabicPeriod"/>
-            </a:pPr>
+            </a:br>
             <a:r>
               <a:rPr lang="en-US" sz="3600" dirty="0"/>
-              <a:t>When you submit the poster, do so in two files: </a:t>
-            </a:r>
-            <a:r>
-              <a:rPr lang="en-US" sz="3600" dirty="0" err="1"/>
-              <a:t>powerpoint</a:t>
-            </a:r>
+              <a:t>it easier for users to compare results.</a:t>
+            </a:r>
+          </a:p>
+          <a:p>
+            <a:endParaRPr lang="en-US" sz="3600" dirty="0"/>
+          </a:p>
+          <a:p>
+            <a:r>
+              <a:rPr lang="en-US" sz="3600" b="1" dirty="0"/>
+              <a:t>How to use</a:t>
+            </a:r>
+          </a:p>
+          <a:p>
             <a:r>
               <a:rPr lang="en-US" sz="3600" dirty="0"/>
-              <a:t> presentation (this file) and PDF file.</a:t>
-            </a:r>
-          </a:p>
-          <a:p>
-            <a:pPr marL="914400" indent="-914400">
-              <a:buFont typeface="+mj-lt"/>
-              <a:buAutoNum type="arabicPeriod"/>
-            </a:pPr>
+              <a:t>Use the settings button to view default options or modify them as you wish</a:t>
+            </a:r>
+          </a:p>
+          <a:p>
             <a:r>
               <a:rPr lang="en-US" sz="3600" dirty="0"/>
-              <a:t>Any images, graphs or charts included in the poster, must have high resolution, sharp markings and texts.</a:t>
-            </a:r>
-          </a:p>
-          <a:p>
-            <a:pPr marL="914400" indent="-914400">
-              <a:buFont typeface="+mj-lt"/>
-              <a:buAutoNum type="arabicPeriod"/>
-            </a:pPr>
+              <a:t>Open an image using the magnifying button</a:t>
+            </a:r>
+          </a:p>
+          <a:p>
             <a:r>
               <a:rPr lang="en-US" sz="3600" dirty="0"/>
-              <a:t>This poster template is in accordance with written above limitations.</a:t>
-            </a:r>
-          </a:p>
-        </p:txBody>
-      </p:sp>
+              <a:t>After selecting an image, use the play button in order to execute the algorithm</a:t>
+            </a:r>
+          </a:p>
+          <a:p>
+            <a:r>
+              <a:rPr lang="en-US" sz="3600" dirty="0"/>
+              <a:t>Progress of the algorithm can be noticed at the bottom of the dialog. We display a progress bar with text telling at which phase we are and how much work (in percentage) we have done</a:t>
+            </a:r>
+          </a:p>
+          <a:p>
+            <a:r>
+              <a:rPr lang="en-US" sz="3600" dirty="0"/>
+              <a:t>Eventually, you can use the pop-out button in order to see the processed image alone in another frame</a:t>
+            </a:r>
+          </a:p>
+          <a:p>
+            <a:endParaRPr lang="en-US" sz="3600" dirty="0"/>
+          </a:p>
+          <a:p>
+            <a:r>
+              <a:rPr lang="en-US" sz="3600" b="1" dirty="0"/>
+              <a:t>Conclusions</a:t>
+            </a:r>
+          </a:p>
+          <a:p>
+            <a:r>
+              <a:rPr lang="en-US" sz="3600" dirty="0"/>
+              <a:t>All expectations as set at the beginning have been met, with extras, for example – making it configurable to let users select thresholds, color, mark sign, and see the progress of the algorithm process by using a progress bar at the bottom of the window while the algorithm is executed.</a:t>
+            </a:r>
+          </a:p>
+          <a:p>
+            <a:r>
+              <a:rPr lang="en-US" sz="3600" dirty="0"/>
+              <a:t>As can be seen at the picture above, we can detect all corners in an image, as long as they are clear. We do have some errors in noisy images, where we recognize false corners, but those errors are the result of using the mathematical approach for corners detection, without a post process that analyze all corners that have been detected, and figures out which one is a real corner and which one is a false corner.</a:t>
+            </a:r>
+          </a:p>
+          <a:p>
+            <a:endParaRPr lang="en-US" sz="3600" dirty="0"/>
+          </a:p>
+          <a:p>
+            <a:r>
+              <a:rPr lang="en-US" sz="3600" b="1" dirty="0"/>
+              <a:t>Discussions</a:t>
+            </a:r>
+          </a:p>
+          <a:p>
+            <a:r>
+              <a:rPr lang="en-US" sz="3600" dirty="0"/>
+              <a:t>Sources of the project, including presentation can be found on my GitHub, under ‘Project’ folder: </a:t>
+            </a:r>
+            <a:r>
+              <a:rPr lang="en-US" sz="3600" dirty="0">
+                <a:hlinkClick r:id="rId3"/>
+              </a:rPr>
+              <a:t>https://github.com/haimadrian/MachineLearningUsingPython</a:t>
+            </a:r>
+            <a:endParaRPr lang="en-US" sz="3600" dirty="0"/>
+          </a:p>
+          <a:p>
+            <a:r>
+              <a:rPr lang="en-US" sz="3600" dirty="0"/>
+              <a:t>Video is available on YouTube: </a:t>
+            </a:r>
+            <a:r>
+              <a:rPr lang="en-US" sz="3600" dirty="0">
+                <a:hlinkClick r:id="rId4"/>
+              </a:rPr>
+              <a:t>https://youtu.be/zGWMElYc2OE</a:t>
+            </a:r>
+            <a:r>
+              <a:rPr lang="en-US" sz="3600" dirty="0"/>
+              <a:t> </a:t>
+            </a:r>
+          </a:p>
+          <a:p>
+            <a:r>
+              <a:rPr lang="en-US" sz="3600" dirty="0"/>
+              <a:t>I use cv2.cornerSubPix as a post-process in order to find the center of each detected corner and use it as the corner, such that the results are more accurate. By using this post-process, I have encountered an issue where the center of the image is detected as a corner, even though it is empty, hence I override it with 0, and take the risk of losing a potential real corner. A more reliable solution could use the original Harris scores for detection of whether there is a corner in the middle of the picture and avoid of overriding it with zero.</a:t>
+            </a:r>
+          </a:p>
+        </p:txBody>
+      </p:sp>
+      <p:pic>
+        <p:nvPicPr>
+          <p:cNvPr id="2" name="Picture 1">
+            <a:extLst>
+              <a:ext uri="{FF2B5EF4-FFF2-40B4-BE49-F238E27FC236}">
+                <a16:creationId xmlns:a16="http://schemas.microsoft.com/office/drawing/2014/main" id="{49D835FA-7AA3-4CAB-AFA8-D82B7C28B1FA}"/>
+              </a:ext>
+            </a:extLst>
+          </p:cNvPr>
+          <p:cNvPicPr>
+            <a:picLocks noChangeAspect="1"/>
+          </p:cNvPicPr>
+          <p:nvPr/>
+        </p:nvPicPr>
+        <p:blipFill>
+          <a:blip r:embed="rId5">
+            <a:extLst>
+              <a:ext uri="{28A0092B-C50C-407E-A947-70E740481C1C}">
+                <a14:useLocalDpi xmlns:a14="http://schemas.microsoft.com/office/drawing/2010/main" val="0"/>
+              </a:ext>
+            </a:extLst>
+          </a:blip>
+          <a:srcRect/>
+          <a:stretch/>
+        </p:blipFill>
+        <p:spPr>
+          <a:xfrm>
+            <a:off x="13169812" y="10209615"/>
+            <a:ext cx="9184272" cy="7257502"/>
+          </a:xfrm>
+          <a:prstGeom prst="rect">
+            <a:avLst/>
+          </a:prstGeom>
+        </p:spPr>
+      </p:pic>
     </p:spTree>
     <p:extLst>
       <p:ext uri="{BB962C8B-B14F-4D97-AF65-F5344CB8AC3E}">

</xml_diff>

<commit_message>
CW9 and QR code for video
</commit_message>
<xml_diff>
--- a/Project/תבנית לפוסטר של פרויקט סוף קורס.pptx
+++ b/Project/תבנית לפוסטר של פרויקט סוף קורס.pptx
@@ -243,7 +243,7 @@
           <a:p>
             <a:fld id="{96F86DA2-6F35-4111-ACB3-E2300C0C7C15}" type="datetimeFigureOut">
               <a:rPr lang="en-GB" smtClean="0"/>
-              <a:t>08/09/2020</a:t>
+              <a:t>10/09/2020</a:t>
             </a:fld>
             <a:endParaRPr lang="en-GB"/>
           </a:p>
@@ -413,7 +413,7 @@
           <a:p>
             <a:fld id="{96F86DA2-6F35-4111-ACB3-E2300C0C7C15}" type="datetimeFigureOut">
               <a:rPr lang="en-GB" smtClean="0"/>
-              <a:t>08/09/2020</a:t>
+              <a:t>10/09/2020</a:t>
             </a:fld>
             <a:endParaRPr lang="en-GB"/>
           </a:p>
@@ -593,7 +593,7 @@
           <a:p>
             <a:fld id="{96F86DA2-6F35-4111-ACB3-E2300C0C7C15}" type="datetimeFigureOut">
               <a:rPr lang="en-GB" smtClean="0"/>
-              <a:t>08/09/2020</a:t>
+              <a:t>10/09/2020</a:t>
             </a:fld>
             <a:endParaRPr lang="en-GB"/>
           </a:p>
@@ -763,7 +763,7 @@
           <a:p>
             <a:fld id="{96F86DA2-6F35-4111-ACB3-E2300C0C7C15}" type="datetimeFigureOut">
               <a:rPr lang="en-GB" smtClean="0"/>
-              <a:t>08/09/2020</a:t>
+              <a:t>10/09/2020</a:t>
             </a:fld>
             <a:endParaRPr lang="en-GB"/>
           </a:p>
@@ -1007,7 +1007,7 @@
           <a:p>
             <a:fld id="{96F86DA2-6F35-4111-ACB3-E2300C0C7C15}" type="datetimeFigureOut">
               <a:rPr lang="en-GB" smtClean="0"/>
-              <a:t>08/09/2020</a:t>
+              <a:t>10/09/2020</a:t>
             </a:fld>
             <a:endParaRPr lang="en-GB"/>
           </a:p>
@@ -1239,7 +1239,7 @@
           <a:p>
             <a:fld id="{96F86DA2-6F35-4111-ACB3-E2300C0C7C15}" type="datetimeFigureOut">
               <a:rPr lang="en-GB" smtClean="0"/>
-              <a:t>08/09/2020</a:t>
+              <a:t>10/09/2020</a:t>
             </a:fld>
             <a:endParaRPr lang="en-GB"/>
           </a:p>
@@ -1606,7 +1606,7 @@
           <a:p>
             <a:fld id="{96F86DA2-6F35-4111-ACB3-E2300C0C7C15}" type="datetimeFigureOut">
               <a:rPr lang="en-GB" smtClean="0"/>
-              <a:t>08/09/2020</a:t>
+              <a:t>10/09/2020</a:t>
             </a:fld>
             <a:endParaRPr lang="en-GB"/>
           </a:p>
@@ -1724,7 +1724,7 @@
           <a:p>
             <a:fld id="{96F86DA2-6F35-4111-ACB3-E2300C0C7C15}" type="datetimeFigureOut">
               <a:rPr lang="en-GB" smtClean="0"/>
-              <a:t>08/09/2020</a:t>
+              <a:t>10/09/2020</a:t>
             </a:fld>
             <a:endParaRPr lang="en-GB"/>
           </a:p>
@@ -1819,7 +1819,7 @@
           <a:p>
             <a:fld id="{96F86DA2-6F35-4111-ACB3-E2300C0C7C15}" type="datetimeFigureOut">
               <a:rPr lang="en-GB" smtClean="0"/>
-              <a:t>08/09/2020</a:t>
+              <a:t>10/09/2020</a:t>
             </a:fld>
             <a:endParaRPr lang="en-GB"/>
           </a:p>
@@ -2096,7 +2096,7 @@
           <a:p>
             <a:fld id="{96F86DA2-6F35-4111-ACB3-E2300C0C7C15}" type="datetimeFigureOut">
               <a:rPr lang="en-GB" smtClean="0"/>
-              <a:t>08/09/2020</a:t>
+              <a:t>10/09/2020</a:t>
             </a:fld>
             <a:endParaRPr lang="en-GB"/>
           </a:p>
@@ -2353,7 +2353,7 @@
           <a:p>
             <a:fld id="{96F86DA2-6F35-4111-ACB3-E2300C0C7C15}" type="datetimeFigureOut">
               <a:rPr lang="en-GB" smtClean="0"/>
-              <a:t>08/09/2020</a:t>
+              <a:t>10/09/2020</a:t>
             </a:fld>
             <a:endParaRPr lang="en-GB"/>
           </a:p>
@@ -2566,7 +2566,7 @@
           <a:p>
             <a:fld id="{96F86DA2-6F35-4111-ACB3-E2300C0C7C15}" type="datetimeFigureOut">
               <a:rPr lang="en-GB" smtClean="0"/>
-              <a:t>08/09/2020</a:t>
+              <a:t>10/09/2020</a:t>
             </a:fld>
             <a:endParaRPr lang="en-GB"/>
           </a:p>
@@ -3300,7 +3300,7 @@
           <a:lstStyle/>
           <a:p>
             <a:pPr algn="ctr"/>
-            <a:endParaRPr lang="en-GB"/>
+            <a:endParaRPr lang="en-GB" dirty="0"/>
           </a:p>
         </p:txBody>
       </p:sp>
@@ -3318,8 +3318,8 @@
         </p:nvSpPr>
         <p:spPr>
           <a:xfrm>
-            <a:off x="2911641" y="7794282"/>
-            <a:ext cx="19659601" cy="24468237"/>
+            <a:off x="2911641" y="7540282"/>
+            <a:ext cx="19659601" cy="25022235"/>
           </a:xfrm>
           <a:prstGeom prst="rect">
             <a:avLst/>
@@ -3498,7 +3498,14 @@
           <a:p>
             <a:r>
               <a:rPr lang="en-US" sz="3600" dirty="0"/>
-              <a:t>Sources of the project, including presentation can be found on my GitHub, under ‘Project’ folder: </a:t>
+              <a:t>Sources of the project, including presentation can be found on my GitHub, </a:t>
+            </a:r>
+            <a:br>
+              <a:rPr lang="en-US" sz="3600" dirty="0"/>
+            </a:br>
+            <a:r>
+              <a:rPr lang="en-US" sz="3600" dirty="0"/>
+              <a:t>under ‘Project’ folder: </a:t>
             </a:r>
             <a:r>
               <a:rPr lang="en-US" sz="3600" dirty="0">
@@ -3523,6 +3530,9 @@
               <a:rPr lang="en-US" sz="3600" dirty="0"/>
               <a:t> </a:t>
             </a:r>
+          </a:p>
+          <a:p>
+            <a:endParaRPr lang="en-US" sz="3600" dirty="0"/>
           </a:p>
           <a:p>
             <a:r>
@@ -3559,7 +3569,7 @@
         </p:blipFill>
         <p:spPr>
           <a:xfrm>
-            <a:off x="13169812" y="10209615"/>
+            <a:off x="13169812" y="9955615"/>
             <a:ext cx="9184272" cy="7257502"/>
           </a:xfrm>
           <a:prstGeom prst="rect">
@@ -3567,6 +3577,77 @@
           </a:prstGeom>
         </p:spPr>
       </p:pic>
+      <p:pic>
+        <p:nvPicPr>
+          <p:cNvPr id="7" name="Picture 6" descr="A picture containing drawing&#10;&#10;Description automatically generated">
+            <a:extLst>
+              <a:ext uri="{FF2B5EF4-FFF2-40B4-BE49-F238E27FC236}">
+                <a16:creationId xmlns:a16="http://schemas.microsoft.com/office/drawing/2014/main" id="{FE685937-C609-4369-A868-013DACE803AD}"/>
+              </a:ext>
+            </a:extLst>
+          </p:cNvPr>
+          <p:cNvPicPr>
+            <a:picLocks noChangeAspect="1"/>
+          </p:cNvPicPr>
+          <p:nvPr/>
+        </p:nvPicPr>
+        <p:blipFill>
+          <a:blip r:embed="rId6">
+            <a:extLst>
+              <a:ext uri="{28A0092B-C50C-407E-A947-70E740481C1C}">
+                <a14:useLocalDpi xmlns:a14="http://schemas.microsoft.com/office/drawing/2010/main" val="0"/>
+              </a:ext>
+            </a:extLst>
+          </a:blip>
+          <a:stretch>
+            <a:fillRect/>
+          </a:stretch>
+        </p:blipFill>
+        <p:spPr>
+          <a:xfrm>
+            <a:off x="19477682" y="26319981"/>
+            <a:ext cx="2667795" cy="2667795"/>
+          </a:xfrm>
+          <a:prstGeom prst="rect">
+            <a:avLst/>
+          </a:prstGeom>
+        </p:spPr>
+      </p:pic>
+      <p:sp>
+        <p:nvSpPr>
+          <p:cNvPr id="8" name="TextBox 7">
+            <a:extLst>
+              <a:ext uri="{FF2B5EF4-FFF2-40B4-BE49-F238E27FC236}">
+                <a16:creationId xmlns:a16="http://schemas.microsoft.com/office/drawing/2014/main" id="{132E536F-4800-4EA7-8188-F07DBE8256E8}"/>
+              </a:ext>
+            </a:extLst>
+          </p:cNvPr>
+          <p:cNvSpPr txBox="1"/>
+          <p:nvPr/>
+        </p:nvSpPr>
+        <p:spPr>
+          <a:xfrm>
+            <a:off x="20264657" y="25777904"/>
+            <a:ext cx="1266693" cy="646331"/>
+          </a:xfrm>
+          <a:prstGeom prst="rect">
+            <a:avLst/>
+          </a:prstGeom>
+          <a:noFill/>
+        </p:spPr>
+        <p:txBody>
+          <a:bodyPr wrap="none" rtlCol="0">
+            <a:spAutoFit/>
+          </a:bodyPr>
+          <a:lstStyle/>
+          <a:p>
+            <a:r>
+              <a:rPr lang="en-US" sz="3600" dirty="0"/>
+              <a:t>Video</a:t>
+            </a:r>
+          </a:p>
+        </p:txBody>
+      </p:sp>
     </p:spTree>
     <p:extLst>
       <p:ext uri="{BB962C8B-B14F-4D97-AF65-F5344CB8AC3E}">

</xml_diff>